<commit_message>
Change images in the presentation
</commit_message>
<xml_diff>
--- a/Documents/Presentation.pptx
+++ b/Documents/Presentation.pptx
@@ -805,7 +805,7 @@
           <a:noFill/>
           <a:extLst>
             <a:ext uri="{909E8E84-426E-40dd-AFC4-6F175D3DCCD1}">
-              <a14:hiddenFill xmlns:a14="http://schemas.microsoft.com/office/drawing/2010/main" xmlns="">
+              <a14:hiddenFill xmlns="" xmlns:a14="http://schemas.microsoft.com/office/drawing/2010/main">
                 <a:solidFill>
                   <a:srgbClr val="FFFFFF"/>
                 </a:solidFill>
@@ -864,7 +864,7 @@
             </a:ln>
             <a:extLst>
               <a:ext uri="{91240B29-F687-4f45-9708-019B960494DF}">
-                <a14:hiddenLine xmlns:a14="http://schemas.microsoft.com/office/drawing/2010/main" xmlns="" w="9525">
+                <a14:hiddenLine xmlns="" xmlns:a14="http://schemas.microsoft.com/office/drawing/2010/main" w="9525">
                   <a:solidFill>
                     <a:srgbClr val="000000"/>
                   </a:solidFill>
@@ -954,7 +954,7 @@
             </a:ln>
             <a:extLst>
               <a:ext uri="{91240B29-F687-4f45-9708-019B960494DF}">
-                <a14:hiddenLine xmlns:a14="http://schemas.microsoft.com/office/drawing/2010/main" xmlns="" w="9525">
+                <a14:hiddenLine xmlns="" xmlns:a14="http://schemas.microsoft.com/office/drawing/2010/main" w="9525">
                   <a:solidFill>
                     <a:srgbClr val="000000"/>
                   </a:solidFill>
@@ -1044,7 +1044,7 @@
             </a:ln>
             <a:extLst>
               <a:ext uri="{91240B29-F687-4f45-9708-019B960494DF}">
-                <a14:hiddenLine xmlns:a14="http://schemas.microsoft.com/office/drawing/2010/main" xmlns="" w="9525">
+                <a14:hiddenLine xmlns="" xmlns:a14="http://schemas.microsoft.com/office/drawing/2010/main" w="9525">
                   <a:solidFill>
                     <a:srgbClr val="000000"/>
                   </a:solidFill>
@@ -1078,7 +1078,7 @@
             </a:ln>
             <a:extLst>
               <a:ext uri="{91240B29-F687-4f45-9708-019B960494DF}">
-                <a14:hiddenLine xmlns:a14="http://schemas.microsoft.com/office/drawing/2010/main" xmlns="" w="9525">
+                <a14:hiddenLine xmlns="" xmlns:a14="http://schemas.microsoft.com/office/drawing/2010/main" w="9525">
                   <a:solidFill>
                     <a:srgbClr val="000000"/>
                   </a:solidFill>
@@ -1168,7 +1168,7 @@
             </a:ln>
             <a:extLst>
               <a:ext uri="{91240B29-F687-4f45-9708-019B960494DF}">
-                <a14:hiddenLine xmlns:a14="http://schemas.microsoft.com/office/drawing/2010/main" xmlns="" w="9525">
+                <a14:hiddenLine xmlns="" xmlns:a14="http://schemas.microsoft.com/office/drawing/2010/main" w="9525">
                   <a:solidFill>
                     <a:srgbClr val="000000"/>
                   </a:solidFill>
@@ -1230,7 +1230,7 @@
             </a:ln>
             <a:extLst>
               <a:ext uri="{91240B29-F687-4f45-9708-019B960494DF}">
-                <a14:hiddenLine xmlns:a14="http://schemas.microsoft.com/office/drawing/2010/main" xmlns="" w="9525">
+                <a14:hiddenLine xmlns="" xmlns:a14="http://schemas.microsoft.com/office/drawing/2010/main" w="9525">
                   <a:solidFill>
                     <a:srgbClr val="000000"/>
                   </a:solidFill>
@@ -1292,7 +1292,7 @@
             </a:ln>
             <a:extLst>
               <a:ext uri="{91240B29-F687-4f45-9708-019B960494DF}">
-                <a14:hiddenLine xmlns:a14="http://schemas.microsoft.com/office/drawing/2010/main" xmlns="" w="9525">
+                <a14:hiddenLine xmlns="" xmlns:a14="http://schemas.microsoft.com/office/drawing/2010/main" w="9525">
                   <a:solidFill>
                     <a:srgbClr val="000000"/>
                   </a:solidFill>
@@ -1382,7 +1382,7 @@
             </a:ln>
             <a:extLst>
               <a:ext uri="{91240B29-F687-4f45-9708-019B960494DF}">
-                <a14:hiddenLine xmlns:a14="http://schemas.microsoft.com/office/drawing/2010/main" xmlns="" w="9525">
+                <a14:hiddenLine xmlns="" xmlns:a14="http://schemas.microsoft.com/office/drawing/2010/main" w="9525">
                   <a:solidFill>
                     <a:srgbClr val="000000"/>
                   </a:solidFill>
@@ -1444,7 +1444,7 @@
             </a:ln>
             <a:extLst>
               <a:ext uri="{91240B29-F687-4f45-9708-019B960494DF}">
-                <a14:hiddenLine xmlns:a14="http://schemas.microsoft.com/office/drawing/2010/main" xmlns="" w="9525">
+                <a14:hiddenLine xmlns="" xmlns:a14="http://schemas.microsoft.com/office/drawing/2010/main" w="9525">
                   <a:solidFill>
                     <a:srgbClr val="000000"/>
                   </a:solidFill>
@@ -1506,7 +1506,7 @@
             </a:ln>
             <a:extLst>
               <a:ext uri="{91240B29-F687-4f45-9708-019B960494DF}">
-                <a14:hiddenLine xmlns:a14="http://schemas.microsoft.com/office/drawing/2010/main" xmlns="" w="9525">
+                <a14:hiddenLine xmlns="" xmlns:a14="http://schemas.microsoft.com/office/drawing/2010/main" w="9525">
                   <a:solidFill>
                     <a:srgbClr val="000000"/>
                   </a:solidFill>
@@ -1596,7 +1596,7 @@
             </a:ln>
             <a:extLst>
               <a:ext uri="{91240B29-F687-4f45-9708-019B960494DF}">
-                <a14:hiddenLine xmlns:a14="http://schemas.microsoft.com/office/drawing/2010/main" xmlns="" w="9525">
+                <a14:hiddenLine xmlns="" xmlns:a14="http://schemas.microsoft.com/office/drawing/2010/main" w="9525">
                   <a:solidFill>
                     <a:srgbClr val="000000"/>
                   </a:solidFill>
@@ -1686,7 +1686,7 @@
             </a:ln>
             <a:extLst>
               <a:ext uri="{91240B29-F687-4f45-9708-019B960494DF}">
-                <a14:hiddenLine xmlns:a14="http://schemas.microsoft.com/office/drawing/2010/main" xmlns="" w="9525">
+                <a14:hiddenLine xmlns="" xmlns:a14="http://schemas.microsoft.com/office/drawing/2010/main" w="9525">
                   <a:solidFill>
                     <a:srgbClr val="000000"/>
                   </a:solidFill>
@@ -1748,7 +1748,7 @@
             </a:ln>
             <a:extLst>
               <a:ext uri="{91240B29-F687-4f45-9708-019B960494DF}">
-                <a14:hiddenLine xmlns:a14="http://schemas.microsoft.com/office/drawing/2010/main" xmlns="" w="9525">
+                <a14:hiddenLine xmlns="" xmlns:a14="http://schemas.microsoft.com/office/drawing/2010/main" w="9525">
                   <a:solidFill>
                     <a:srgbClr val="000000"/>
                   </a:solidFill>
@@ -1858,7 +1858,7 @@
             </a:ln>
             <a:extLst>
               <a:ext uri="{91240B29-F687-4f45-9708-019B960494DF}">
-                <a14:hiddenLine xmlns:a14="http://schemas.microsoft.com/office/drawing/2010/main" xmlns="" w="9525">
+                <a14:hiddenLine xmlns="" xmlns:a14="http://schemas.microsoft.com/office/drawing/2010/main" w="9525">
                   <a:solidFill>
                     <a:srgbClr val="000000"/>
                   </a:solidFill>
@@ -1920,7 +1920,7 @@
             </a:ln>
             <a:extLst>
               <a:ext uri="{91240B29-F687-4f45-9708-019B960494DF}">
-                <a14:hiddenLine xmlns:a14="http://schemas.microsoft.com/office/drawing/2010/main" xmlns="" w="9525">
+                <a14:hiddenLine xmlns="" xmlns:a14="http://schemas.microsoft.com/office/drawing/2010/main" w="9525">
                   <a:solidFill>
                     <a:srgbClr val="000000"/>
                   </a:solidFill>
@@ -2010,7 +2010,7 @@
             </a:ln>
             <a:extLst>
               <a:ext uri="{91240B29-F687-4f45-9708-019B960494DF}">
-                <a14:hiddenLine xmlns:a14="http://schemas.microsoft.com/office/drawing/2010/main" xmlns="" w="9525">
+                <a14:hiddenLine xmlns="" xmlns:a14="http://schemas.microsoft.com/office/drawing/2010/main" w="9525">
                   <a:solidFill>
                     <a:srgbClr val="000000"/>
                   </a:solidFill>
@@ -2100,7 +2100,7 @@
             </a:ln>
             <a:extLst>
               <a:ext uri="{91240B29-F687-4f45-9708-019B960494DF}">
-                <a14:hiddenLine xmlns:a14="http://schemas.microsoft.com/office/drawing/2010/main" xmlns="" w="9525">
+                <a14:hiddenLine xmlns="" xmlns:a14="http://schemas.microsoft.com/office/drawing/2010/main" w="9525">
                   <a:solidFill>
                     <a:srgbClr val="000000"/>
                   </a:solidFill>
@@ -2162,7 +2162,7 @@
             </a:ln>
             <a:extLst>
               <a:ext uri="{91240B29-F687-4f45-9708-019B960494DF}">
-                <a14:hiddenLine xmlns:a14="http://schemas.microsoft.com/office/drawing/2010/main" xmlns="" w="9525">
+                <a14:hiddenLine xmlns="" xmlns:a14="http://schemas.microsoft.com/office/drawing/2010/main" w="9525">
                   <a:solidFill>
                     <a:srgbClr val="000000"/>
                   </a:solidFill>
@@ -2252,7 +2252,7 @@
             </a:ln>
             <a:extLst>
               <a:ext uri="{91240B29-F687-4f45-9708-019B960494DF}">
-                <a14:hiddenLine xmlns:a14="http://schemas.microsoft.com/office/drawing/2010/main" xmlns="" w="9525">
+                <a14:hiddenLine xmlns="" xmlns:a14="http://schemas.microsoft.com/office/drawing/2010/main" w="9525">
                   <a:solidFill>
                     <a:srgbClr val="000000"/>
                   </a:solidFill>
@@ -2342,7 +2342,7 @@
             </a:ln>
             <a:extLst>
               <a:ext uri="{91240B29-F687-4f45-9708-019B960494DF}">
-                <a14:hiddenLine xmlns:a14="http://schemas.microsoft.com/office/drawing/2010/main" xmlns="" w="9525">
+                <a14:hiddenLine xmlns="" xmlns:a14="http://schemas.microsoft.com/office/drawing/2010/main" w="9525">
                   <a:solidFill>
                     <a:srgbClr val="000000"/>
                   </a:solidFill>
@@ -2398,7 +2398,7 @@
             </a:ln>
             <a:extLst>
               <a:ext uri="{91240B29-F687-4f45-9708-019B960494DF}">
-                <a14:hiddenLine xmlns:a14="http://schemas.microsoft.com/office/drawing/2010/main" xmlns="" w="9525">
+                <a14:hiddenLine xmlns="" xmlns:a14="http://schemas.microsoft.com/office/drawing/2010/main" w="9525">
                   <a:solidFill>
                     <a:srgbClr val="000000"/>
                   </a:solidFill>
@@ -2488,7 +2488,7 @@
             </a:ln>
             <a:extLst>
               <a:ext uri="{91240B29-F687-4f45-9708-019B960494DF}">
-                <a14:hiddenLine xmlns:a14="http://schemas.microsoft.com/office/drawing/2010/main" xmlns="" w="9525">
+                <a14:hiddenLine xmlns="" xmlns:a14="http://schemas.microsoft.com/office/drawing/2010/main" w="9525">
                   <a:solidFill>
                     <a:srgbClr val="000000"/>
                   </a:solidFill>
@@ -2544,7 +2544,7 @@
             </a:ln>
             <a:extLst>
               <a:ext uri="{91240B29-F687-4f45-9708-019B960494DF}">
-                <a14:hiddenLine xmlns:a14="http://schemas.microsoft.com/office/drawing/2010/main" xmlns="" w="9525">
+                <a14:hiddenLine xmlns="" xmlns:a14="http://schemas.microsoft.com/office/drawing/2010/main" w="9525">
                   <a:solidFill>
                     <a:srgbClr val="000000"/>
                   </a:solidFill>
@@ -2634,7 +2634,7 @@
             </a:ln>
             <a:extLst>
               <a:ext uri="{91240B29-F687-4f45-9708-019B960494DF}">
-                <a14:hiddenLine xmlns:a14="http://schemas.microsoft.com/office/drawing/2010/main" xmlns="" w="9525">
+                <a14:hiddenLine xmlns="" xmlns:a14="http://schemas.microsoft.com/office/drawing/2010/main" w="9525">
                   <a:solidFill>
                     <a:srgbClr val="000000"/>
                   </a:solidFill>
@@ -2702,7 +2702,7 @@
             </a:ln>
             <a:extLst>
               <a:ext uri="{91240B29-F687-4f45-9708-019B960494DF}">
-                <a14:hiddenLine xmlns:a14="http://schemas.microsoft.com/office/drawing/2010/main" xmlns="" w="9525">
+                <a14:hiddenLine xmlns="" xmlns:a14="http://schemas.microsoft.com/office/drawing/2010/main" w="9525">
                   <a:solidFill>
                     <a:srgbClr val="000000"/>
                   </a:solidFill>
@@ -2792,7 +2792,7 @@
             </a:ln>
             <a:extLst>
               <a:ext uri="{91240B29-F687-4f45-9708-019B960494DF}">
-                <a14:hiddenLine xmlns:a14="http://schemas.microsoft.com/office/drawing/2010/main" xmlns="" w="9525">
+                <a14:hiddenLine xmlns="" xmlns:a14="http://schemas.microsoft.com/office/drawing/2010/main" w="9525">
                   <a:solidFill>
                     <a:srgbClr val="000000"/>
                   </a:solidFill>
@@ -2860,7 +2860,7 @@
             </a:ln>
             <a:extLst>
               <a:ext uri="{91240B29-F687-4f45-9708-019B960494DF}">
-                <a14:hiddenLine xmlns:a14="http://schemas.microsoft.com/office/drawing/2010/main" xmlns="" w="9525">
+                <a14:hiddenLine xmlns="" xmlns:a14="http://schemas.microsoft.com/office/drawing/2010/main" w="9525">
                   <a:solidFill>
                     <a:srgbClr val="000000"/>
                   </a:solidFill>
@@ -2950,7 +2950,7 @@
             </a:ln>
             <a:extLst>
               <a:ext uri="{91240B29-F687-4f45-9708-019B960494DF}">
-                <a14:hiddenLine xmlns:a14="http://schemas.microsoft.com/office/drawing/2010/main" xmlns="" w="9525">
+                <a14:hiddenLine xmlns="" xmlns:a14="http://schemas.microsoft.com/office/drawing/2010/main" w="9525">
                   <a:solidFill>
                     <a:srgbClr val="000000"/>
                   </a:solidFill>
@@ -2984,7 +2984,7 @@
             </a:ln>
             <a:extLst>
               <a:ext uri="{91240B29-F687-4f45-9708-019B960494DF}">
-                <a14:hiddenLine xmlns:a14="http://schemas.microsoft.com/office/drawing/2010/main" xmlns="" w="9525">
+                <a14:hiddenLine xmlns="" xmlns:a14="http://schemas.microsoft.com/office/drawing/2010/main" w="9525">
                   <a:solidFill>
                     <a:srgbClr val="000000"/>
                   </a:solidFill>
@@ -3074,7 +3074,7 @@
             </a:ln>
             <a:extLst>
               <a:ext uri="{91240B29-F687-4f45-9708-019B960494DF}">
-                <a14:hiddenLine xmlns:a14="http://schemas.microsoft.com/office/drawing/2010/main" xmlns="" w="9525">
+                <a14:hiddenLine xmlns="" xmlns:a14="http://schemas.microsoft.com/office/drawing/2010/main" w="9525">
                   <a:solidFill>
                     <a:srgbClr val="000000"/>
                   </a:solidFill>
@@ -3136,7 +3136,7 @@
             </a:ln>
             <a:extLst>
               <a:ext uri="{91240B29-F687-4f45-9708-019B960494DF}">
-                <a14:hiddenLine xmlns:a14="http://schemas.microsoft.com/office/drawing/2010/main" xmlns="" w="9525">
+                <a14:hiddenLine xmlns="" xmlns:a14="http://schemas.microsoft.com/office/drawing/2010/main" w="9525">
                   <a:solidFill>
                     <a:srgbClr val="000000"/>
                   </a:solidFill>
@@ -3198,7 +3198,7 @@
             </a:ln>
             <a:extLst>
               <a:ext uri="{91240B29-F687-4f45-9708-019B960494DF}">
-                <a14:hiddenLine xmlns:a14="http://schemas.microsoft.com/office/drawing/2010/main" xmlns="" w="9525">
+                <a14:hiddenLine xmlns="" xmlns:a14="http://schemas.microsoft.com/office/drawing/2010/main" w="9525">
                   <a:solidFill>
                     <a:srgbClr val="000000"/>
                   </a:solidFill>
@@ -3288,7 +3288,7 @@
             </a:ln>
             <a:extLst>
               <a:ext uri="{91240B29-F687-4f45-9708-019B960494DF}">
-                <a14:hiddenLine xmlns:a14="http://schemas.microsoft.com/office/drawing/2010/main" xmlns="" w="9525">
+                <a14:hiddenLine xmlns="" xmlns:a14="http://schemas.microsoft.com/office/drawing/2010/main" w="9525">
                   <a:solidFill>
                     <a:srgbClr val="000000"/>
                   </a:solidFill>
@@ -3356,7 +3356,7 @@
             </a:ln>
             <a:extLst>
               <a:ext uri="{91240B29-F687-4f45-9708-019B960494DF}">
-                <a14:hiddenLine xmlns:a14="http://schemas.microsoft.com/office/drawing/2010/main" xmlns="" w="9525">
+                <a14:hiddenLine xmlns="" xmlns:a14="http://schemas.microsoft.com/office/drawing/2010/main" w="9525">
                   <a:solidFill>
                     <a:srgbClr val="000000"/>
                   </a:solidFill>
@@ -3418,7 +3418,7 @@
             </a:ln>
             <a:extLst>
               <a:ext uri="{91240B29-F687-4f45-9708-019B960494DF}">
-                <a14:hiddenLine xmlns:a14="http://schemas.microsoft.com/office/drawing/2010/main" xmlns="" w="9525">
+                <a14:hiddenLine xmlns="" xmlns:a14="http://schemas.microsoft.com/office/drawing/2010/main" w="9525">
                   <a:solidFill>
                     <a:srgbClr val="000000"/>
                   </a:solidFill>
@@ -3508,7 +3508,7 @@
             </a:ln>
             <a:extLst>
               <a:ext uri="{91240B29-F687-4f45-9708-019B960494DF}">
-                <a14:hiddenLine xmlns:a14="http://schemas.microsoft.com/office/drawing/2010/main" xmlns="" w="9525">
+                <a14:hiddenLine xmlns="" xmlns:a14="http://schemas.microsoft.com/office/drawing/2010/main" w="9525">
                   <a:solidFill>
                     <a:srgbClr val="000000"/>
                   </a:solidFill>
@@ -3570,7 +3570,7 @@
             </a:ln>
             <a:extLst>
               <a:ext uri="{91240B29-F687-4f45-9708-019B960494DF}">
-                <a14:hiddenLine xmlns:a14="http://schemas.microsoft.com/office/drawing/2010/main" xmlns="" w="9525">
+                <a14:hiddenLine xmlns="" xmlns:a14="http://schemas.microsoft.com/office/drawing/2010/main" w="9525">
                   <a:solidFill>
                     <a:srgbClr val="000000"/>
                   </a:solidFill>
@@ -3660,7 +3660,7 @@
             </a:ln>
             <a:extLst>
               <a:ext uri="{91240B29-F687-4f45-9708-019B960494DF}">
-                <a14:hiddenLine xmlns:a14="http://schemas.microsoft.com/office/drawing/2010/main" xmlns="" w="9525">
+                <a14:hiddenLine xmlns="" xmlns:a14="http://schemas.microsoft.com/office/drawing/2010/main" w="9525">
                   <a:solidFill>
                     <a:srgbClr val="000000"/>
                   </a:solidFill>
@@ -3722,7 +3722,7 @@
             </a:ln>
             <a:extLst>
               <a:ext uri="{91240B29-F687-4f45-9708-019B960494DF}">
-                <a14:hiddenLine xmlns:a14="http://schemas.microsoft.com/office/drawing/2010/main" xmlns="" w="9525">
+                <a14:hiddenLine xmlns="" xmlns:a14="http://schemas.microsoft.com/office/drawing/2010/main" w="9525">
                   <a:solidFill>
                     <a:srgbClr val="000000"/>
                   </a:solidFill>
@@ -3812,7 +3812,7 @@
             </a:ln>
             <a:extLst>
               <a:ext uri="{91240B29-F687-4f45-9708-019B960494DF}">
-                <a14:hiddenLine xmlns:a14="http://schemas.microsoft.com/office/drawing/2010/main" xmlns="" w="9525">
+                <a14:hiddenLine xmlns="" xmlns:a14="http://schemas.microsoft.com/office/drawing/2010/main" w="9525">
                   <a:solidFill>
                     <a:srgbClr val="000000"/>
                   </a:solidFill>
@@ -3846,7 +3846,7 @@
             </a:ln>
             <a:extLst>
               <a:ext uri="{91240B29-F687-4f45-9708-019B960494DF}">
-                <a14:hiddenLine xmlns:a14="http://schemas.microsoft.com/office/drawing/2010/main" xmlns="" w="9525">
+                <a14:hiddenLine xmlns="" xmlns:a14="http://schemas.microsoft.com/office/drawing/2010/main" w="9525">
                   <a:solidFill>
                     <a:srgbClr val="000000"/>
                   </a:solidFill>
@@ -3911,7 +3911,7 @@
             </a:ln>
             <a:extLst>
               <a:ext uri="{91240B29-F687-4f45-9708-019B960494DF}">
-                <a14:hiddenLine xmlns:a14="http://schemas.microsoft.com/office/drawing/2010/main" xmlns="" w="9525">
+                <a14:hiddenLine xmlns="" xmlns:a14="http://schemas.microsoft.com/office/drawing/2010/main" w="9525">
                   <a:solidFill>
                     <a:srgbClr val="000000"/>
                   </a:solidFill>
@@ -4001,7 +4001,7 @@
             </a:ln>
             <a:extLst>
               <a:ext uri="{91240B29-F687-4f45-9708-019B960494DF}">
-                <a14:hiddenLine xmlns:a14="http://schemas.microsoft.com/office/drawing/2010/main" xmlns="" w="9525">
+                <a14:hiddenLine xmlns="" xmlns:a14="http://schemas.microsoft.com/office/drawing/2010/main" w="9525">
                   <a:solidFill>
                     <a:srgbClr val="000000"/>
                   </a:solidFill>
@@ -4063,7 +4063,7 @@
             </a:ln>
             <a:extLst>
               <a:ext uri="{91240B29-F687-4f45-9708-019B960494DF}">
-                <a14:hiddenLine xmlns:a14="http://schemas.microsoft.com/office/drawing/2010/main" xmlns="" w="9525">
+                <a14:hiddenLine xmlns="" xmlns:a14="http://schemas.microsoft.com/office/drawing/2010/main" w="9525">
                   <a:solidFill>
                     <a:srgbClr val="000000"/>
                   </a:solidFill>
@@ -4153,7 +4153,7 @@
             </a:ln>
             <a:extLst>
               <a:ext uri="{91240B29-F687-4f45-9708-019B960494DF}">
-                <a14:hiddenLine xmlns:a14="http://schemas.microsoft.com/office/drawing/2010/main" xmlns="" w="9525">
+                <a14:hiddenLine xmlns="" xmlns:a14="http://schemas.microsoft.com/office/drawing/2010/main" w="9525">
                   <a:solidFill>
                     <a:srgbClr val="000000"/>
                   </a:solidFill>
@@ -4243,7 +4243,7 @@
             </a:ln>
             <a:extLst>
               <a:ext uri="{91240B29-F687-4f45-9708-019B960494DF}">
-                <a14:hiddenLine xmlns:a14="http://schemas.microsoft.com/office/drawing/2010/main" xmlns="" w="9525">
+                <a14:hiddenLine xmlns="" xmlns:a14="http://schemas.microsoft.com/office/drawing/2010/main" w="9525">
                   <a:solidFill>
                     <a:srgbClr val="000000"/>
                   </a:solidFill>
@@ -4308,7 +4308,7 @@
             </a:ln>
             <a:extLst>
               <a:ext uri="{91240B29-F687-4f45-9708-019B960494DF}">
-                <a14:hiddenLine xmlns:a14="http://schemas.microsoft.com/office/drawing/2010/main" xmlns="" w="9525">
+                <a14:hiddenLine xmlns="" xmlns:a14="http://schemas.microsoft.com/office/drawing/2010/main" w="9525">
                   <a:solidFill>
                     <a:srgbClr val="000000"/>
                   </a:solidFill>
@@ -4370,7 +4370,7 @@
             </a:ln>
             <a:extLst>
               <a:ext uri="{91240B29-F687-4f45-9708-019B960494DF}">
-                <a14:hiddenLine xmlns:a14="http://schemas.microsoft.com/office/drawing/2010/main" xmlns="" w="9525">
+                <a14:hiddenLine xmlns="" xmlns:a14="http://schemas.microsoft.com/office/drawing/2010/main" w="9525">
                   <a:solidFill>
                     <a:srgbClr val="000000"/>
                   </a:solidFill>
@@ -4460,7 +4460,7 @@
             </a:ln>
             <a:extLst>
               <a:ext uri="{91240B29-F687-4f45-9708-019B960494DF}">
-                <a14:hiddenLine xmlns:a14="http://schemas.microsoft.com/office/drawing/2010/main" xmlns="" w="9525">
+                <a14:hiddenLine xmlns="" xmlns:a14="http://schemas.microsoft.com/office/drawing/2010/main" w="9525">
                   <a:solidFill>
                     <a:srgbClr val="000000"/>
                   </a:solidFill>
@@ -4550,7 +4550,7 @@
             </a:ln>
             <a:extLst>
               <a:ext uri="{91240B29-F687-4f45-9708-019B960494DF}">
-                <a14:hiddenLine xmlns:a14="http://schemas.microsoft.com/office/drawing/2010/main" xmlns="" w="9525">
+                <a14:hiddenLine xmlns="" xmlns:a14="http://schemas.microsoft.com/office/drawing/2010/main" w="9525">
                   <a:solidFill>
                     <a:srgbClr val="000000"/>
                   </a:solidFill>
@@ -4612,7 +4612,7 @@
             </a:ln>
             <a:extLst>
               <a:ext uri="{91240B29-F687-4f45-9708-019B960494DF}">
-                <a14:hiddenLine xmlns:a14="http://schemas.microsoft.com/office/drawing/2010/main" xmlns="" w="9525">
+                <a14:hiddenLine xmlns="" xmlns:a14="http://schemas.microsoft.com/office/drawing/2010/main" w="9525">
                   <a:solidFill>
                     <a:srgbClr val="000000"/>
                   </a:solidFill>
@@ -4732,7 +4732,7 @@
             </a:ln>
             <a:extLst>
               <a:ext uri="{91240B29-F687-4f45-9708-019B960494DF}">
-                <a14:hiddenLine xmlns:a14="http://schemas.microsoft.com/office/drawing/2010/main" xmlns="" w="9525">
+                <a14:hiddenLine xmlns="" xmlns:a14="http://schemas.microsoft.com/office/drawing/2010/main" w="9525">
                   <a:solidFill>
                     <a:srgbClr val="000000"/>
                   </a:solidFill>
@@ -4800,7 +4800,7 @@
             </a:ln>
             <a:extLst>
               <a:ext uri="{91240B29-F687-4f45-9708-019B960494DF}">
-                <a14:hiddenLine xmlns:a14="http://schemas.microsoft.com/office/drawing/2010/main" xmlns="" w="9525">
+                <a14:hiddenLine xmlns="" xmlns:a14="http://schemas.microsoft.com/office/drawing/2010/main" w="9525">
                   <a:solidFill>
                     <a:srgbClr val="000000"/>
                   </a:solidFill>
@@ -4890,7 +4890,7 @@
             </a:ln>
             <a:extLst>
               <a:ext uri="{91240B29-F687-4f45-9708-019B960494DF}">
-                <a14:hiddenLine xmlns:a14="http://schemas.microsoft.com/office/drawing/2010/main" xmlns="" w="9525">
+                <a14:hiddenLine xmlns="" xmlns:a14="http://schemas.microsoft.com/office/drawing/2010/main" w="9525">
                   <a:solidFill>
                     <a:srgbClr val="000000"/>
                   </a:solidFill>
@@ -9704,7 +9704,7 @@
           <a:noFill/>
           <a:extLst>
             <a:ext uri="{909E8E84-426E-40dd-AFC4-6F175D3DCCD1}">
-              <a14:hiddenFill xmlns:a14="http://schemas.microsoft.com/office/drawing/2010/main" xmlns="">
+              <a14:hiddenFill xmlns="" xmlns:a14="http://schemas.microsoft.com/office/drawing/2010/main">
                 <a:solidFill>
                   <a:srgbClr val="FFFFFF"/>
                 </a:solidFill>
@@ -9778,7 +9778,7 @@
               </a:ln>
               <a:extLst>
                 <a:ext uri="{91240B29-F687-4f45-9708-019B960494DF}">
-                  <a14:hiddenLine xmlns:a14="http://schemas.microsoft.com/office/drawing/2010/main" xmlns="" w="9525">
+                  <a14:hiddenLine xmlns="" xmlns:a14="http://schemas.microsoft.com/office/drawing/2010/main" w="9525">
                     <a:solidFill>
                       <a:srgbClr val="000000"/>
                     </a:solidFill>
@@ -9868,7 +9868,7 @@
               </a:ln>
               <a:extLst>
                 <a:ext uri="{91240B29-F687-4f45-9708-019B960494DF}">
-                  <a14:hiddenLine xmlns:a14="http://schemas.microsoft.com/office/drawing/2010/main" xmlns="" w="9525">
+                  <a14:hiddenLine xmlns="" xmlns:a14="http://schemas.microsoft.com/office/drawing/2010/main" w="9525">
                     <a:solidFill>
                       <a:srgbClr val="000000"/>
                     </a:solidFill>
@@ -9958,7 +9958,7 @@
               </a:ln>
               <a:extLst>
                 <a:ext uri="{91240B29-F687-4f45-9708-019B960494DF}">
-                  <a14:hiddenLine xmlns:a14="http://schemas.microsoft.com/office/drawing/2010/main" xmlns="" w="9525">
+                  <a14:hiddenLine xmlns="" xmlns:a14="http://schemas.microsoft.com/office/drawing/2010/main" w="9525">
                     <a:solidFill>
                       <a:srgbClr val="000000"/>
                     </a:solidFill>
@@ -10020,7 +10020,7 @@
               </a:ln>
               <a:extLst>
                 <a:ext uri="{91240B29-F687-4f45-9708-019B960494DF}">
-                  <a14:hiddenLine xmlns:a14="http://schemas.microsoft.com/office/drawing/2010/main" xmlns="" w="9525">
+                  <a14:hiddenLine xmlns="" xmlns:a14="http://schemas.microsoft.com/office/drawing/2010/main" w="9525">
                     <a:solidFill>
                       <a:srgbClr val="000000"/>
                     </a:solidFill>
@@ -10110,7 +10110,7 @@
               </a:ln>
               <a:extLst>
                 <a:ext uri="{91240B29-F687-4f45-9708-019B960494DF}">
-                  <a14:hiddenLine xmlns:a14="http://schemas.microsoft.com/office/drawing/2010/main" xmlns="" w="9525">
+                  <a14:hiddenLine xmlns="" xmlns:a14="http://schemas.microsoft.com/office/drawing/2010/main" w="9525">
                     <a:solidFill>
                       <a:srgbClr val="000000"/>
                     </a:solidFill>
@@ -10172,7 +10172,7 @@
               </a:ln>
               <a:extLst>
                 <a:ext uri="{91240B29-F687-4f45-9708-019B960494DF}">
-                  <a14:hiddenLine xmlns:a14="http://schemas.microsoft.com/office/drawing/2010/main" xmlns="" w="9525">
+                  <a14:hiddenLine xmlns="" xmlns:a14="http://schemas.microsoft.com/office/drawing/2010/main" w="9525">
                     <a:solidFill>
                       <a:srgbClr val="000000"/>
                     </a:solidFill>
@@ -10234,7 +10234,7 @@
               </a:ln>
               <a:extLst>
                 <a:ext uri="{91240B29-F687-4f45-9708-019B960494DF}">
-                  <a14:hiddenLine xmlns:a14="http://schemas.microsoft.com/office/drawing/2010/main" xmlns="" w="9525">
+                  <a14:hiddenLine xmlns="" xmlns:a14="http://schemas.microsoft.com/office/drawing/2010/main" w="9525">
                     <a:solidFill>
                       <a:srgbClr val="000000"/>
                     </a:solidFill>
@@ -10324,7 +10324,7 @@
               </a:ln>
               <a:extLst>
                 <a:ext uri="{91240B29-F687-4f45-9708-019B960494DF}">
-                  <a14:hiddenLine xmlns:a14="http://schemas.microsoft.com/office/drawing/2010/main" xmlns="" w="9525">
+                  <a14:hiddenLine xmlns="" xmlns:a14="http://schemas.microsoft.com/office/drawing/2010/main" w="9525">
                     <a:solidFill>
                       <a:srgbClr val="000000"/>
                     </a:solidFill>
@@ -10414,7 +10414,7 @@
               </a:ln>
               <a:extLst>
                 <a:ext uri="{91240B29-F687-4f45-9708-019B960494DF}">
-                  <a14:hiddenLine xmlns:a14="http://schemas.microsoft.com/office/drawing/2010/main" xmlns="" w="9525">
+                  <a14:hiddenLine xmlns="" xmlns:a14="http://schemas.microsoft.com/office/drawing/2010/main" w="9525">
                     <a:solidFill>
                       <a:srgbClr val="000000"/>
                     </a:solidFill>
@@ -10476,7 +10476,7 @@
               </a:ln>
               <a:extLst>
                 <a:ext uri="{91240B29-F687-4f45-9708-019B960494DF}">
-                  <a14:hiddenLine xmlns:a14="http://schemas.microsoft.com/office/drawing/2010/main" xmlns="" w="9525">
+                  <a14:hiddenLine xmlns="" xmlns:a14="http://schemas.microsoft.com/office/drawing/2010/main" w="9525">
                     <a:solidFill>
                       <a:srgbClr val="000000"/>
                     </a:solidFill>
@@ -10586,7 +10586,7 @@
               </a:ln>
               <a:extLst>
                 <a:ext uri="{91240B29-F687-4f45-9708-019B960494DF}">
-                  <a14:hiddenLine xmlns:a14="http://schemas.microsoft.com/office/drawing/2010/main" xmlns="" w="9525">
+                  <a14:hiddenLine xmlns="" xmlns:a14="http://schemas.microsoft.com/office/drawing/2010/main" w="9525">
                     <a:solidFill>
                       <a:srgbClr val="000000"/>
                     </a:solidFill>
@@ -10670,7 +10670,7 @@
               </a:ln>
               <a:extLst>
                 <a:ext uri="{91240B29-F687-4f45-9708-019B960494DF}">
-                  <a14:hiddenLine xmlns:a14="http://schemas.microsoft.com/office/drawing/2010/main" xmlns="" w="9525">
+                  <a14:hiddenLine xmlns="" xmlns:a14="http://schemas.microsoft.com/office/drawing/2010/main" w="9525">
                     <a:solidFill>
                       <a:srgbClr val="000000"/>
                     </a:solidFill>
@@ -10732,7 +10732,7 @@
               </a:ln>
               <a:extLst>
                 <a:ext uri="{91240B29-F687-4f45-9708-019B960494DF}">
-                  <a14:hiddenLine xmlns:a14="http://schemas.microsoft.com/office/drawing/2010/main" xmlns="" w="9525">
+                  <a14:hiddenLine xmlns="" xmlns:a14="http://schemas.microsoft.com/office/drawing/2010/main" w="9525">
                     <a:solidFill>
                       <a:srgbClr val="000000"/>
                     </a:solidFill>
@@ -10794,7 +10794,7 @@
               </a:ln>
               <a:extLst>
                 <a:ext uri="{91240B29-F687-4f45-9708-019B960494DF}">
-                  <a14:hiddenLine xmlns:a14="http://schemas.microsoft.com/office/drawing/2010/main" xmlns="" w="9525">
+                  <a14:hiddenLine xmlns="" xmlns:a14="http://schemas.microsoft.com/office/drawing/2010/main" w="9525">
                     <a:solidFill>
                       <a:srgbClr val="000000"/>
                     </a:solidFill>
@@ -10884,7 +10884,7 @@
               </a:ln>
               <a:extLst>
                 <a:ext uri="{91240B29-F687-4f45-9708-019B960494DF}">
-                  <a14:hiddenLine xmlns:a14="http://schemas.microsoft.com/office/drawing/2010/main" xmlns="" w="9525">
+                  <a14:hiddenLine xmlns="" xmlns:a14="http://schemas.microsoft.com/office/drawing/2010/main" w="9525">
                     <a:solidFill>
                       <a:srgbClr val="000000"/>
                     </a:solidFill>
@@ -10918,7 +10918,7 @@
               </a:ln>
               <a:extLst>
                 <a:ext uri="{91240B29-F687-4f45-9708-019B960494DF}">
-                  <a14:hiddenLine xmlns:a14="http://schemas.microsoft.com/office/drawing/2010/main" xmlns="" w="9525">
+                  <a14:hiddenLine xmlns="" xmlns:a14="http://schemas.microsoft.com/office/drawing/2010/main" w="9525">
                     <a:solidFill>
                       <a:srgbClr val="000000"/>
                     </a:solidFill>
@@ -10983,7 +10983,7 @@
               </a:ln>
               <a:extLst>
                 <a:ext uri="{91240B29-F687-4f45-9708-019B960494DF}">
-                  <a14:hiddenLine xmlns:a14="http://schemas.microsoft.com/office/drawing/2010/main" xmlns="" w="9525">
+                  <a14:hiddenLine xmlns="" xmlns:a14="http://schemas.microsoft.com/office/drawing/2010/main" w="9525">
                     <a:solidFill>
                       <a:srgbClr val="000000"/>
                     </a:solidFill>
@@ -11073,7 +11073,7 @@
               </a:ln>
               <a:extLst>
                 <a:ext uri="{91240B29-F687-4f45-9708-019B960494DF}">
-                  <a14:hiddenLine xmlns:a14="http://schemas.microsoft.com/office/drawing/2010/main" xmlns="" w="9525">
+                  <a14:hiddenLine xmlns="" xmlns:a14="http://schemas.microsoft.com/office/drawing/2010/main" w="9525">
                     <a:solidFill>
                       <a:srgbClr val="000000"/>
                     </a:solidFill>
@@ -11135,7 +11135,7 @@
               </a:ln>
               <a:extLst>
                 <a:ext uri="{91240B29-F687-4f45-9708-019B960494DF}">
-                  <a14:hiddenLine xmlns:a14="http://schemas.microsoft.com/office/drawing/2010/main" xmlns="" w="9525">
+                  <a14:hiddenLine xmlns="" xmlns:a14="http://schemas.microsoft.com/office/drawing/2010/main" w="9525">
                     <a:solidFill>
                       <a:srgbClr val="000000"/>
                     </a:solidFill>
@@ -11225,7 +11225,7 @@
               </a:ln>
               <a:extLst>
                 <a:ext uri="{91240B29-F687-4f45-9708-019B960494DF}">
-                  <a14:hiddenLine xmlns:a14="http://schemas.microsoft.com/office/drawing/2010/main" xmlns="" w="9525">
+                  <a14:hiddenLine xmlns="" xmlns:a14="http://schemas.microsoft.com/office/drawing/2010/main" w="9525">
                     <a:solidFill>
                       <a:srgbClr val="000000"/>
                     </a:solidFill>
@@ -11290,7 +11290,7 @@
               </a:ln>
               <a:extLst>
                 <a:ext uri="{91240B29-F687-4f45-9708-019B960494DF}">
-                  <a14:hiddenLine xmlns:a14="http://schemas.microsoft.com/office/drawing/2010/main" xmlns="" w="9525">
+                  <a14:hiddenLine xmlns="" xmlns:a14="http://schemas.microsoft.com/office/drawing/2010/main" w="9525">
                     <a:solidFill>
                       <a:srgbClr val="000000"/>
                     </a:solidFill>
@@ -11352,7 +11352,7 @@
               </a:ln>
               <a:extLst>
                 <a:ext uri="{91240B29-F687-4f45-9708-019B960494DF}">
-                  <a14:hiddenLine xmlns:a14="http://schemas.microsoft.com/office/drawing/2010/main" xmlns="" w="9525">
+                  <a14:hiddenLine xmlns="" xmlns:a14="http://schemas.microsoft.com/office/drawing/2010/main" w="9525">
                     <a:solidFill>
                       <a:srgbClr val="000000"/>
                     </a:solidFill>
@@ -11442,7 +11442,7 @@
               </a:ln>
               <a:extLst>
                 <a:ext uri="{91240B29-F687-4f45-9708-019B960494DF}">
-                  <a14:hiddenLine xmlns:a14="http://schemas.microsoft.com/office/drawing/2010/main" xmlns="" w="9525">
+                  <a14:hiddenLine xmlns="" xmlns:a14="http://schemas.microsoft.com/office/drawing/2010/main" w="9525">
                     <a:solidFill>
                       <a:srgbClr val="000000"/>
                     </a:solidFill>
@@ -11532,7 +11532,7 @@
               </a:ln>
               <a:extLst>
                 <a:ext uri="{91240B29-F687-4f45-9708-019B960494DF}">
-                  <a14:hiddenLine xmlns:a14="http://schemas.microsoft.com/office/drawing/2010/main" xmlns="" w="9525">
+                  <a14:hiddenLine xmlns="" xmlns:a14="http://schemas.microsoft.com/office/drawing/2010/main" w="9525">
                     <a:solidFill>
                       <a:srgbClr val="000000"/>
                     </a:solidFill>
@@ -11597,7 +11597,7 @@
               </a:ln>
               <a:extLst>
                 <a:ext uri="{91240B29-F687-4f45-9708-019B960494DF}">
-                  <a14:hiddenLine xmlns:a14="http://schemas.microsoft.com/office/drawing/2010/main" xmlns="" w="9525">
+                  <a14:hiddenLine xmlns="" xmlns:a14="http://schemas.microsoft.com/office/drawing/2010/main" w="9525">
                     <a:solidFill>
                       <a:srgbClr val="000000"/>
                     </a:solidFill>
@@ -11717,7 +11717,7 @@
               </a:ln>
               <a:extLst>
                 <a:ext uri="{91240B29-F687-4f45-9708-019B960494DF}">
-                  <a14:hiddenLine xmlns:a14="http://schemas.microsoft.com/office/drawing/2010/main" xmlns="" w="9525">
+                  <a14:hiddenLine xmlns="" xmlns:a14="http://schemas.microsoft.com/office/drawing/2010/main" w="9525">
                     <a:solidFill>
                       <a:srgbClr val="000000"/>
                     </a:solidFill>
@@ -11798,7 +11798,7 @@
               </a:ln>
               <a:extLst>
                 <a:ext uri="{91240B29-F687-4f45-9708-019B960494DF}">
-                  <a14:hiddenLine xmlns:a14="http://schemas.microsoft.com/office/drawing/2010/main" xmlns="" w="9525">
+                  <a14:hiddenLine xmlns="" xmlns:a14="http://schemas.microsoft.com/office/drawing/2010/main" w="9525">
                     <a:solidFill>
                       <a:srgbClr val="000000"/>
                     </a:solidFill>
@@ -11913,7 +11913,7 @@
               </a:ln>
               <a:extLst>
                 <a:ext uri="{91240B29-F687-4f45-9708-019B960494DF}">
-                  <a14:hiddenLine xmlns:a14="http://schemas.microsoft.com/office/drawing/2010/main" xmlns="" w="9525">
+                  <a14:hiddenLine xmlns="" xmlns:a14="http://schemas.microsoft.com/office/drawing/2010/main" w="9525">
                     <a:solidFill>
                       <a:srgbClr val="000000"/>
                     </a:solidFill>
@@ -12003,7 +12003,7 @@
               </a:ln>
               <a:extLst>
                 <a:ext uri="{91240B29-F687-4f45-9708-019B960494DF}">
-                  <a14:hiddenLine xmlns:a14="http://schemas.microsoft.com/office/drawing/2010/main" xmlns="" w="9525">
+                  <a14:hiddenLine xmlns="" xmlns:a14="http://schemas.microsoft.com/office/drawing/2010/main" w="9525">
                     <a:solidFill>
                       <a:srgbClr val="000000"/>
                     </a:solidFill>
@@ -12068,7 +12068,7 @@
               </a:ln>
               <a:extLst>
                 <a:ext uri="{91240B29-F687-4f45-9708-019B960494DF}">
-                  <a14:hiddenLine xmlns:a14="http://schemas.microsoft.com/office/drawing/2010/main" xmlns="" w="9525">
+                  <a14:hiddenLine xmlns="" xmlns:a14="http://schemas.microsoft.com/office/drawing/2010/main" w="9525">
                     <a:solidFill>
                       <a:srgbClr val="000000"/>
                     </a:solidFill>
@@ -12158,7 +12158,7 @@
               </a:ln>
               <a:extLst>
                 <a:ext uri="{91240B29-F687-4f45-9708-019B960494DF}">
-                  <a14:hiddenLine xmlns:a14="http://schemas.microsoft.com/office/drawing/2010/main" xmlns="" w="9525">
+                  <a14:hiddenLine xmlns="" xmlns:a14="http://schemas.microsoft.com/office/drawing/2010/main" w="9525">
                     <a:solidFill>
                       <a:srgbClr val="000000"/>
                     </a:solidFill>
@@ -12226,7 +12226,7 @@
               </a:ln>
               <a:extLst>
                 <a:ext uri="{91240B29-F687-4f45-9708-019B960494DF}">
-                  <a14:hiddenLine xmlns:a14="http://schemas.microsoft.com/office/drawing/2010/main" xmlns="" w="9525">
+                  <a14:hiddenLine xmlns="" xmlns:a14="http://schemas.microsoft.com/office/drawing/2010/main" w="9525">
                     <a:solidFill>
                       <a:srgbClr val="000000"/>
                     </a:solidFill>
@@ -12316,7 +12316,7 @@
               </a:ln>
               <a:extLst>
                 <a:ext uri="{91240B29-F687-4f45-9708-019B960494DF}">
-                  <a14:hiddenLine xmlns:a14="http://schemas.microsoft.com/office/drawing/2010/main" xmlns="" w="9525">
+                  <a14:hiddenLine xmlns="" xmlns:a14="http://schemas.microsoft.com/office/drawing/2010/main" w="9525">
                     <a:solidFill>
                       <a:srgbClr val="000000"/>
                     </a:solidFill>
@@ -12384,7 +12384,7 @@
               </a:ln>
               <a:extLst>
                 <a:ext uri="{91240B29-F687-4f45-9708-019B960494DF}">
-                  <a14:hiddenLine xmlns:a14="http://schemas.microsoft.com/office/drawing/2010/main" xmlns="" w="9525">
+                  <a14:hiddenLine xmlns="" xmlns:a14="http://schemas.microsoft.com/office/drawing/2010/main" w="9525">
                     <a:solidFill>
                       <a:srgbClr val="000000"/>
                     </a:solidFill>
@@ -12474,7 +12474,7 @@
               </a:ln>
               <a:extLst>
                 <a:ext uri="{91240B29-F687-4f45-9708-019B960494DF}">
-                  <a14:hiddenLine xmlns:a14="http://schemas.microsoft.com/office/drawing/2010/main" xmlns="" w="9525">
+                  <a14:hiddenLine xmlns="" xmlns:a14="http://schemas.microsoft.com/office/drawing/2010/main" w="9525">
                     <a:solidFill>
                       <a:srgbClr val="000000"/>
                     </a:solidFill>
@@ -12508,7 +12508,7 @@
               </a:ln>
               <a:extLst>
                 <a:ext uri="{91240B29-F687-4f45-9708-019B960494DF}">
-                  <a14:hiddenLine xmlns:a14="http://schemas.microsoft.com/office/drawing/2010/main" xmlns="" w="9525">
+                  <a14:hiddenLine xmlns="" xmlns:a14="http://schemas.microsoft.com/office/drawing/2010/main" w="9525">
                     <a:solidFill>
                       <a:srgbClr val="000000"/>
                     </a:solidFill>
@@ -13229,67 +13229,7 @@
         <p:spPr>
           <a:xfrm>
             <a:off x="594872" y="2002055"/>
-            <a:ext cx="2046772" cy="2046772"/>
-          </a:xfrm>
-          <a:prstGeom prst="rect">
-            <a:avLst/>
-          </a:prstGeom>
-        </p:spPr>
-      </p:pic>
-      <p:pic>
-        <p:nvPicPr>
-          <p:cNvPr id="7" name="Picture 6" descr="A picture containing wall, person, indoor, posing&#10;&#10;Description automatically generated">
-            <a:extLst>
-              <a:ext uri="{FF2B5EF4-FFF2-40B4-BE49-F238E27FC236}">
-                <a16:creationId xmlns:a16="http://schemas.microsoft.com/office/drawing/2014/main" id="{CB4A3C0F-E08F-4783-9CE4-028D6FC39E75}"/>
-              </a:ext>
-            </a:extLst>
-          </p:cNvPr>
-          <p:cNvPicPr>
-            <a:picLocks noChangeAspect="1"/>
-          </p:cNvPicPr>
-          <p:nvPr/>
-        </p:nvPicPr>
-        <p:blipFill>
-          <a:blip r:embed="rId3"/>
-          <a:stretch>
-            <a:fillRect/>
-          </a:stretch>
-        </p:blipFill>
-        <p:spPr>
-          <a:xfrm>
-            <a:off x="3322844" y="1971501"/>
-            <a:ext cx="2086951" cy="2086951"/>
-          </a:xfrm>
-          <a:prstGeom prst="rect">
-            <a:avLst/>
-          </a:prstGeom>
-        </p:spPr>
-      </p:pic>
-      <p:pic>
-        <p:nvPicPr>
-          <p:cNvPr id="11" name="Picture 10" descr="A person wearing glasses&#10;&#10;Description automatically generated with medium confidence">
-            <a:extLst>
-              <a:ext uri="{FF2B5EF4-FFF2-40B4-BE49-F238E27FC236}">
-                <a16:creationId xmlns:a16="http://schemas.microsoft.com/office/drawing/2014/main" id="{83B25039-5684-F0B0-8BCB-5E7C64796ADC}"/>
-              </a:ext>
-            </a:extLst>
-          </p:cNvPr>
-          <p:cNvPicPr>
-            <a:picLocks noChangeAspect="1"/>
-          </p:cNvPicPr>
-          <p:nvPr/>
-        </p:nvPicPr>
-        <p:blipFill>
-          <a:blip r:embed="rId4"/>
-          <a:stretch>
-            <a:fillRect/>
-          </a:stretch>
-        </p:blipFill>
-        <p:spPr>
-          <a:xfrm>
-            <a:off x="6166400" y="2002055"/>
-            <a:ext cx="2086951" cy="2086951"/>
+            <a:ext cx="2078434" cy="2046772"/>
           </a:xfrm>
           <a:prstGeom prst="rect">
             <a:avLst/>
@@ -13790,36 +13730,6 @@
           </a:p>
         </p:txBody>
       </p:sp>
-      <p:pic>
-        <p:nvPicPr>
-          <p:cNvPr id="17" name="Picture 16" descr="A person wearing glasses&#10;&#10;Description automatically generated with medium confidence">
-            <a:extLst>
-              <a:ext uri="{FF2B5EF4-FFF2-40B4-BE49-F238E27FC236}">
-                <a16:creationId xmlns:a16="http://schemas.microsoft.com/office/drawing/2014/main" id="{6ADCFF66-0B9F-BAFF-2D7D-5791AB7428A3}"/>
-              </a:ext>
-            </a:extLst>
-          </p:cNvPr>
-          <p:cNvPicPr>
-            <a:picLocks noChangeAspect="1"/>
-          </p:cNvPicPr>
-          <p:nvPr/>
-        </p:nvPicPr>
-        <p:blipFill>
-          <a:blip r:embed="rId5"/>
-          <a:stretch>
-            <a:fillRect/>
-          </a:stretch>
-        </p:blipFill>
-        <p:spPr>
-          <a:xfrm>
-            <a:off x="9304506" y="1961876"/>
-            <a:ext cx="2086951" cy="2086951"/>
-          </a:xfrm>
-          <a:prstGeom prst="rect">
-            <a:avLst/>
-          </a:prstGeom>
-        </p:spPr>
-      </p:pic>
       <p:sp>
         <p:nvSpPr>
           <p:cNvPr id="18" name="Content Placeholder 12">
@@ -14034,16 +13944,101 @@
           <a:p>
             <a:r>
               <a:rPr lang="en-US" dirty="0"/>
-              <a:t>QA </a:t>
+              <a:t>QA Engineer</a:t>
             </a:r>
-            <a:r>
-              <a:rPr lang="en-US" dirty="0" err="1"/>
-              <a:t>Enginner</a:t>
-            </a:r>
-            <a:endParaRPr lang="en-US" dirty="0"/>
           </a:p>
         </p:txBody>
       </p:sp>
+      <p:pic>
+        <p:nvPicPr>
+          <p:cNvPr id="8" name="Picture 7" descr="A person in a blue shirt&#10;&#10;Description automatically generated with medium confidence">
+            <a:extLst>
+              <a:ext uri="{FF2B5EF4-FFF2-40B4-BE49-F238E27FC236}">
+                <a16:creationId xmlns:a16="http://schemas.microsoft.com/office/drawing/2014/main" id="{0C268714-D4CF-A516-E981-0B7972D78C84}"/>
+              </a:ext>
+            </a:extLst>
+          </p:cNvPr>
+          <p:cNvPicPr>
+            <a:picLocks noChangeAspect="1"/>
+          </p:cNvPicPr>
+          <p:nvPr/>
+        </p:nvPicPr>
+        <p:blipFill>
+          <a:blip r:embed="rId3"/>
+          <a:stretch>
+            <a:fillRect/>
+          </a:stretch>
+        </p:blipFill>
+        <p:spPr>
+          <a:xfrm>
+            <a:off x="3519054" y="2002055"/>
+            <a:ext cx="2078434" cy="2032286"/>
+          </a:xfrm>
+          <a:prstGeom prst="rect">
+            <a:avLst/>
+          </a:prstGeom>
+        </p:spPr>
+      </p:pic>
+      <p:pic>
+        <p:nvPicPr>
+          <p:cNvPr id="10" name="Picture 9" descr="A person wearing glasses&#10;&#10;Description automatically generated with medium confidence">
+            <a:extLst>
+              <a:ext uri="{FF2B5EF4-FFF2-40B4-BE49-F238E27FC236}">
+                <a16:creationId xmlns:a16="http://schemas.microsoft.com/office/drawing/2014/main" id="{4B5C8A45-5E55-ABED-2AC2-69F8A2F9CBBB}"/>
+              </a:ext>
+            </a:extLst>
+          </p:cNvPr>
+          <p:cNvPicPr>
+            <a:picLocks noChangeAspect="1"/>
+          </p:cNvPicPr>
+          <p:nvPr/>
+        </p:nvPicPr>
+        <p:blipFill>
+          <a:blip r:embed="rId4"/>
+          <a:stretch>
+            <a:fillRect/>
+          </a:stretch>
+        </p:blipFill>
+        <p:spPr>
+          <a:xfrm>
+            <a:off x="9071052" y="2009297"/>
+            <a:ext cx="2078434" cy="2032287"/>
+          </a:xfrm>
+          <a:prstGeom prst="rect">
+            <a:avLst/>
+          </a:prstGeom>
+        </p:spPr>
+      </p:pic>
+      <p:pic>
+        <p:nvPicPr>
+          <p:cNvPr id="14" name="Picture 13" descr="A person wearing glasses&#10;&#10;Description automatically generated with low confidence">
+            <a:extLst>
+              <a:ext uri="{FF2B5EF4-FFF2-40B4-BE49-F238E27FC236}">
+                <a16:creationId xmlns:a16="http://schemas.microsoft.com/office/drawing/2014/main" id="{B39F5B9F-6501-4088-9772-CE582D4B9286}"/>
+              </a:ext>
+            </a:extLst>
+          </p:cNvPr>
+          <p:cNvPicPr>
+            <a:picLocks noChangeAspect="1"/>
+          </p:cNvPicPr>
+          <p:nvPr/>
+        </p:nvPicPr>
+        <p:blipFill>
+          <a:blip r:embed="rId5"/>
+          <a:stretch>
+            <a:fillRect/>
+          </a:stretch>
+        </p:blipFill>
+        <p:spPr>
+          <a:xfrm>
+            <a:off x="6295053" y="2009297"/>
+            <a:ext cx="2078433" cy="2025044"/>
+          </a:xfrm>
+          <a:prstGeom prst="rect">
+            <a:avLst/>
+          </a:prstGeom>
+        </p:spPr>
+      </p:pic>
     </p:spTree>
     <p:extLst>
       <p:ext uri="{BB962C8B-B14F-4D97-AF65-F5344CB8AC3E}">
@@ -16141,6 +16136,15 @@
 </file>
 
 <file path=customXml/item1.xml><?xml version="1.0" encoding="utf-8"?>
+<?mso-contentType ?>
+<FormTemplates xmlns="http://schemas.microsoft.com/sharepoint/v3/contenttype/forms">
+  <Display>DocumentLibraryForm</Display>
+  <Edit>DocumentLibraryForm</Edit>
+  <New>DocumentLibraryForm</New>
+</FormTemplates>
+</file>
+
+<file path=customXml/item2.xml><?xml version="1.0" encoding="utf-8"?>
 <ct:contentTypeSchema xmlns:ct="http://schemas.microsoft.com/office/2006/metadata/contentType" xmlns:ma="http://schemas.microsoft.com/office/2006/metadata/properties/metaAttributes" ct:_="" ma:_="" ma:contentTypeName="Document" ma:contentTypeID="0x01010079F111ED35F8CC479449609E8A0923A6" ma:contentTypeVersion="11" ma:contentTypeDescription="Create a new document." ma:contentTypeScope="" ma:versionID="96291512c1ee715ab617f4c07df79fc1">
   <xsd:schema xmlns:xsd="http://www.w3.org/2001/XMLSchema" xmlns:xs="http://www.w3.org/2001/XMLSchema" xmlns:p="http://schemas.microsoft.com/office/2006/metadata/properties" xmlns:ns2="71af3243-3dd4-4a8d-8c0d-dd76da1f02a5" xmlns:ns3="16c05727-aa75-4e4a-9b5f-8a80a1165891" targetNamespace="http://schemas.microsoft.com/office/2006/metadata/properties" ma:root="true" ma:fieldsID="8256c27c40ca5c40ce1cf6c44f0205df" ns2:_="" ns3:_="">
     <xsd:import namespace="71af3243-3dd4-4a8d-8c0d-dd76da1f02a5"/>
@@ -16351,15 +16355,6 @@
 </ct:contentTypeSchema>
 </file>
 
-<file path=customXml/item2.xml><?xml version="1.0" encoding="utf-8"?>
-<?mso-contentType ?>
-<FormTemplates xmlns="http://schemas.microsoft.com/sharepoint/v3/contenttype/forms">
-  <Display>DocumentLibraryForm</Display>
-  <Edit>DocumentLibraryForm</Edit>
-  <New>DocumentLibraryForm</New>
-</FormTemplates>
-</file>
-
 <file path=customXml/item3.xml><?xml version="1.0" encoding="utf-8"?>
 <p:properties xmlns:p="http://schemas.microsoft.com/office/2006/metadata/properties" xmlns:xsi="http://www.w3.org/2001/XMLSchema-instance" xmlns:pc="http://schemas.microsoft.com/office/infopath/2007/PartnerControls">
   <documentManagement>
@@ -16369,6 +16364,14 @@
 </file>
 
 <file path=customXml/itemProps1.xml><?xml version="1.0" encoding="utf-8"?>
+<ds:datastoreItem xmlns:ds="http://schemas.openxmlformats.org/officeDocument/2006/customXml" ds:itemID="{B579702B-25C7-40D7-9E29-7686B11A9660}">
+  <ds:schemaRefs>
+    <ds:schemaRef ds:uri="http://schemas.microsoft.com/sharepoint/v3/contenttype/forms"/>
+  </ds:schemaRefs>
+</ds:datastoreItem>
+</file>
+
+<file path=customXml/itemProps2.xml><?xml version="1.0" encoding="utf-8"?>
 <ds:datastoreItem xmlns:ds="http://schemas.openxmlformats.org/officeDocument/2006/customXml" ds:itemID="{A7C0B241-13E5-418D-8920-D23491E2D2C0}">
   <ds:schemaRefs>
     <ds:schemaRef ds:uri="http://schemas.microsoft.com/office/2006/metadata/contentType"/>
@@ -16387,14 +16390,6 @@
 </ds:datastoreItem>
 </file>
 
-<file path=customXml/itemProps2.xml><?xml version="1.0" encoding="utf-8"?>
-<ds:datastoreItem xmlns:ds="http://schemas.openxmlformats.org/officeDocument/2006/customXml" ds:itemID="{B579702B-25C7-40D7-9E29-7686B11A9660}">
-  <ds:schemaRefs>
-    <ds:schemaRef ds:uri="http://schemas.microsoft.com/sharepoint/v3/contenttype/forms"/>
-  </ds:schemaRefs>
-</ds:datastoreItem>
-</file>
-
 <file path=customXml/itemProps3.xml><?xml version="1.0" encoding="utf-8"?>
 <ds:datastoreItem xmlns:ds="http://schemas.openxmlformats.org/officeDocument/2006/customXml" ds:itemID="{E7866CFD-F94E-4AE5-ACEA-86FEC0F48A10}">
   <ds:schemaRefs>

</xml_diff>